<commit_message>
Updated version of Poster. Cleaned Sentiment Analysis
</commit_message>
<xml_diff>
--- a/Sony_Poster.pptx
+++ b/Sony_Poster.pptx
@@ -246,7 +246,7 @@
       <p15:sldGuideLst xmlns:p15="http://schemas.microsoft.com/office/powerpoint/2012/main"/>
     </p:ext>
     <p:ext uri="http://customooxmlschemas.google.com/">
-      <go:slidesCustomData xmlns:go="http://customooxmlschemas.google.com/" xmlns:p15="http://schemas.microsoft.com/office/powerpoint/2012/main" xmlns:p14="http://schemas.microsoft.com/office/powerpoint/2010/main" xmlns:com="http://schemas.openxmlformats.org/drawingml/2006/compatibility" xmlns:pvml="urn:schemas-microsoft-com:office:powerpoint" xmlns:v="urn:schemas-microsoft-com:vml" xmlns:o="urn:schemas-microsoft-com:office:office" xmlns:dgm="http://schemas.openxmlformats.org/drawingml/2006/diagram" xmlns:c="http://schemas.openxmlformats.org/drawingml/2006/chart" xmlns:mv="urn:schemas-microsoft-com:mac:vml" xmlns:mc="http://schemas.openxmlformats.org/markup-compatibility/2006" xmlns="" r:id="rId7" roundtripDataSignature="AMtx7mhLFngkMTy56aMr5fm2iMEFdctUjw=="/>
+      <go:slidesCustomData xmlns="" xmlns:mc="http://schemas.openxmlformats.org/markup-compatibility/2006" xmlns:mv="urn:schemas-microsoft-com:mac:vml" xmlns:c="http://schemas.openxmlformats.org/drawingml/2006/chart" xmlns:dgm="http://schemas.openxmlformats.org/drawingml/2006/diagram" xmlns:o="urn:schemas-microsoft-com:office:office" xmlns:v="urn:schemas-microsoft-com:vml" xmlns:pvml="urn:schemas-microsoft-com:office:powerpoint" xmlns:com="http://schemas.openxmlformats.org/drawingml/2006/compatibility" xmlns:p14="http://schemas.microsoft.com/office/powerpoint/2010/main" xmlns:p15="http://schemas.microsoft.com/office/powerpoint/2012/main" xmlns:go="http://customooxmlschemas.google.com/" r:id="rId7" roundtripDataSignature="AMtx7mhLFngkMTy56aMr5fm2iMEFdctUjw=="/>
     </p:ext>
   </p:extLst>
 </p:presentation>
@@ -21527,7 +21527,7 @@
       </p:sp>
       <p:pic>
         <p:nvPicPr>
-          <p:cNvPr id="193" name="Google Shape;193;p1"/>
+          <p:cNvPr id="194" name="Google Shape;194;p1"/>
           <p:cNvPicPr preferRelativeResize="0"/>
           <p:nvPr/>
         </p:nvPicPr>
@@ -21541,35 +21541,7 @@
         </p:blipFill>
         <p:spPr>
           <a:xfrm>
-            <a:off x="21949975" y="13450250"/>
-            <a:ext cx="5343474" cy="2518850"/>
-          </a:xfrm>
-          <a:prstGeom prst="rect">
-            <a:avLst/>
-          </a:prstGeom>
-          <a:noFill/>
-          <a:ln>
-            <a:noFill/>
-          </a:ln>
-        </p:spPr>
-      </p:pic>
-      <p:pic>
-        <p:nvPicPr>
-          <p:cNvPr id="194" name="Google Shape;194;p1"/>
-          <p:cNvPicPr preferRelativeResize="0"/>
-          <p:nvPr/>
-        </p:nvPicPr>
-        <p:blipFill>
-          <a:blip r:embed="rId13">
-            <a:alphaModFix/>
-          </a:blip>
-          <a:stretch>
-            <a:fillRect/>
-          </a:stretch>
-        </p:blipFill>
-        <p:spPr>
-          <a:xfrm>
-            <a:off x="21099975" y="12923950"/>
+            <a:off x="21177525" y="12923950"/>
             <a:ext cx="1785001" cy="1303026"/>
           </a:xfrm>
           <a:prstGeom prst="rect">
@@ -21588,7 +21560,7 @@
           <p:nvPr/>
         </p:nvPicPr>
         <p:blipFill>
-          <a:blip r:embed="rId14">
+          <a:blip r:embed="rId13">
             <a:alphaModFix/>
           </a:blip>
           <a:stretch>
@@ -21597,7 +21569,7 @@
         </p:blipFill>
         <p:spPr>
           <a:xfrm>
-            <a:off x="22339000" y="13637139"/>
+            <a:off x="21099975" y="14339724"/>
             <a:ext cx="1940100" cy="1243810"/>
           </a:xfrm>
           <a:prstGeom prst="rect">
@@ -21644,7 +21616,7 @@
               <a:buNone/>
             </a:pPr>
             <a:r>
-              <a:rPr lang="en-US" sz="1800" b="1">
+              <a:rPr lang="en-US" sz="1800" b="1" dirty="0">
                 <a:latin typeface="Calibri"/>
                 <a:ea typeface="Calibri"/>
                 <a:cs typeface="Calibri"/>
@@ -21652,7 +21624,7 @@
               </a:rPr>
               <a:t>Findings:</a:t>
             </a:r>
-            <a:endParaRPr b="1">
+            <a:endParaRPr b="1" dirty="0">
               <a:latin typeface="Calibri"/>
               <a:ea typeface="Calibri"/>
               <a:cs typeface="Calibri"/>
@@ -21671,10 +21643,10 @@
               <a:buChar char="●"/>
             </a:pPr>
             <a:r>
-              <a:rPr lang="en-US"/>
-              <a:t>Significant proportion of artist posts are positive. The trend is similar between Facebook posts and tweets.</a:t>
+              <a:rPr lang="en-US" sz="1600" dirty="0"/>
+              <a:t>Significant proportion of artist’s posts are positive. The trend is similar between Facebook posts and tweets.</a:t>
             </a:r>
-            <a:endParaRPr/>
+            <a:endParaRPr sz="1600" dirty="0"/>
           </a:p>
           <a:p>
             <a:pPr marL="457200" lvl="0" indent="-317500" algn="l" rtl="0">
@@ -21688,10 +21660,10 @@
               <a:buChar char="●"/>
             </a:pPr>
             <a:r>
-              <a:rPr lang="en-US"/>
-              <a:t>No significant correlation found between Social Engagement Scores and Tweets/Facebook Posts.</a:t>
+              <a:rPr lang="en-US" sz="1600" dirty="0"/>
+              <a:t>No significant correlation found between Social Engagement Scores and Sentiment of Tweets/Facebook Posts.</a:t>
             </a:r>
-            <a:endParaRPr/>
+            <a:endParaRPr sz="1600" dirty="0"/>
           </a:p>
         </p:txBody>
       </p:sp>
@@ -21702,7 +21674,7 @@
           <p:nvPr/>
         </p:nvPicPr>
         <p:blipFill>
-          <a:blip r:embed="rId15">
+          <a:blip r:embed="rId14">
             <a:alphaModFix/>
           </a:blip>
           <a:stretch>
@@ -21711,36 +21683,8 @@
         </p:blipFill>
         <p:spPr>
           <a:xfrm>
-            <a:off x="29206675" y="12861703"/>
-            <a:ext cx="2807101" cy="1981809"/>
-          </a:xfrm>
-          <a:prstGeom prst="rect">
-            <a:avLst/>
-          </a:prstGeom>
-          <a:noFill/>
-          <a:ln>
-            <a:noFill/>
-          </a:ln>
-        </p:spPr>
-      </p:pic>
-      <p:pic>
-        <p:nvPicPr>
-          <p:cNvPr id="198" name="Google Shape;198;p1"/>
-          <p:cNvPicPr preferRelativeResize="0"/>
-          <p:nvPr/>
-        </p:nvPicPr>
-        <p:blipFill>
-          <a:blip r:embed="rId16">
-            <a:alphaModFix/>
-          </a:blip>
-          <a:stretch>
-            <a:fillRect/>
-          </a:stretch>
-        </p:blipFill>
-        <p:spPr>
-          <a:xfrm>
-            <a:off x="27517725" y="14784872"/>
-            <a:ext cx="2767501" cy="1559315"/>
+            <a:off x="28704927" y="13419835"/>
+            <a:ext cx="3022111" cy="2264464"/>
           </a:xfrm>
           <a:prstGeom prst="rect">
             <a:avLst/>
@@ -22106,7 +22050,7 @@
           <p:nvPr/>
         </p:nvPicPr>
         <p:blipFill>
-          <a:blip r:embed="rId17"/>
+          <a:blip r:embed="rId15"/>
           <a:stretch>
             <a:fillRect/>
           </a:stretch>
@@ -22279,15 +22223,12 @@
               </a:buClr>
               <a:buSzPts val="1800"/>
             </a:pPr>
-            <a:r>
-              <a:rPr lang="en-US" sz="2600" dirty="0">
-                <a:latin typeface="Calibri"/>
-                <a:ea typeface="Calibri"/>
-                <a:cs typeface="Calibri"/>
-                <a:sym typeface="Calibri"/>
-              </a:rPr>
-              <a:t>…</a:t>
-            </a:r>
+            <a:endParaRPr lang="en-US" sz="2600" dirty="0">
+              <a:latin typeface="Calibri"/>
+              <a:ea typeface="Calibri"/>
+              <a:cs typeface="Calibri"/>
+              <a:sym typeface="Calibri"/>
+            </a:endParaRPr>
           </a:p>
           <a:p>
             <a:pPr marL="514350" marR="0" lvl="0" indent="-514350" algn="l" rtl="0">
@@ -22344,6 +22285,36 @@
           </a:p>
         </p:txBody>
       </p:sp>
+      <p:pic>
+        <p:nvPicPr>
+          <p:cNvPr id="2" name="Picture 1">
+            <a:extLst>
+              <a:ext uri="{FF2B5EF4-FFF2-40B4-BE49-F238E27FC236}">
+                <a16:creationId xmlns:a16="http://schemas.microsoft.com/office/drawing/2014/main" id="{73C13FAA-7E88-4DCB-B422-69BDBE66B93E}"/>
+              </a:ext>
+            </a:extLst>
+          </p:cNvPr>
+          <p:cNvPicPr>
+            <a:picLocks noChangeAspect="1"/>
+          </p:cNvPicPr>
+          <p:nvPr/>
+        </p:nvPicPr>
+        <p:blipFill>
+          <a:blip r:embed="rId16"/>
+          <a:stretch>
+            <a:fillRect/>
+          </a:stretch>
+        </p:blipFill>
+        <p:spPr>
+          <a:xfrm>
+            <a:off x="23311431" y="13433316"/>
+            <a:ext cx="5157175" cy="2582087"/>
+          </a:xfrm>
+          <a:prstGeom prst="rect">
+            <a:avLst/>
+          </a:prstGeom>
+        </p:spPr>
+      </p:pic>
     </p:spTree>
   </p:cSld>
   <p:clrMapOvr>

</xml_diff>